<commit_message>
FINAL paper and presentation uploaded
</commit_message>
<xml_diff>
--- a/Presentation.pptx
+++ b/Presentation.pptx
@@ -8935,7 +8935,7 @@
           <a:p>
             <a:fld id="{D686002E-580E-44D7-A942-32649A3AE9B3}" type="datetimeFigureOut">
               <a:rPr lang="en-US" smtClean="0"/>
-              <a:t>4/16/2014</a:t>
+              <a:t>4/17/2014</a:t>
             </a:fld>
             <a:endParaRPr lang="en-US"/>
           </a:p>
@@ -9142,7 +9142,7 @@
           <a:p>
             <a:fld id="{D686002E-580E-44D7-A942-32649A3AE9B3}" type="datetimeFigureOut">
               <a:rPr lang="en-US" smtClean="0"/>
-              <a:t>4/16/2014</a:t>
+              <a:t>4/17/2014</a:t>
             </a:fld>
             <a:endParaRPr lang="en-US"/>
           </a:p>
@@ -9322,7 +9322,7 @@
           <a:p>
             <a:fld id="{D686002E-580E-44D7-A942-32649A3AE9B3}" type="datetimeFigureOut">
               <a:rPr lang="en-US" smtClean="0"/>
-              <a:t>4/16/2014</a:t>
+              <a:t>4/17/2014</a:t>
             </a:fld>
             <a:endParaRPr lang="en-US"/>
           </a:p>
@@ -9527,7 +9527,7 @@
           <a:p>
             <a:fld id="{D686002E-580E-44D7-A942-32649A3AE9B3}" type="datetimeFigureOut">
               <a:rPr lang="en-US" smtClean="0"/>
-              <a:t>4/16/2014</a:t>
+              <a:t>4/17/2014</a:t>
             </a:fld>
             <a:endParaRPr lang="en-US"/>
           </a:p>
@@ -18425,7 +18425,7 @@
           <a:p>
             <a:fld id="{D686002E-580E-44D7-A942-32649A3AE9B3}" type="datetimeFigureOut">
               <a:rPr lang="en-US" smtClean="0"/>
-              <a:t>4/16/2014</a:t>
+              <a:t>4/17/2014</a:t>
             </a:fld>
             <a:endParaRPr lang="en-US"/>
           </a:p>
@@ -18699,7 +18699,7 @@
           <a:p>
             <a:fld id="{D686002E-580E-44D7-A942-32649A3AE9B3}" type="datetimeFigureOut">
               <a:rPr lang="en-US" smtClean="0"/>
-              <a:t>4/16/2014</a:t>
+              <a:t>4/17/2014</a:t>
             </a:fld>
             <a:endParaRPr lang="en-US"/>
           </a:p>
@@ -19097,7 +19097,7 @@
           <a:p>
             <a:fld id="{D686002E-580E-44D7-A942-32649A3AE9B3}" type="datetimeFigureOut">
               <a:rPr lang="en-US" smtClean="0"/>
-              <a:t>4/16/2014</a:t>
+              <a:t>4/17/2014</a:t>
             </a:fld>
             <a:endParaRPr lang="en-US"/>
           </a:p>
@@ -19215,7 +19215,7 @@
           <a:p>
             <a:fld id="{D686002E-580E-44D7-A942-32649A3AE9B3}" type="datetimeFigureOut">
               <a:rPr lang="en-US" smtClean="0"/>
-              <a:t>4/16/2014</a:t>
+              <a:t>4/17/2014</a:t>
             </a:fld>
             <a:endParaRPr lang="en-US"/>
           </a:p>
@@ -19310,7 +19310,7 @@
           <a:p>
             <a:fld id="{D686002E-580E-44D7-A942-32649A3AE9B3}" type="datetimeFigureOut">
               <a:rPr lang="en-US" smtClean="0"/>
-              <a:t>4/16/2014</a:t>
+              <a:t>4/17/2014</a:t>
             </a:fld>
             <a:endParaRPr lang="en-US"/>
           </a:p>
@@ -19600,7 +19600,7 @@
           <a:p>
             <a:fld id="{D686002E-580E-44D7-A942-32649A3AE9B3}" type="datetimeFigureOut">
               <a:rPr lang="en-US" smtClean="0"/>
-              <a:t>4/16/2014</a:t>
+              <a:t>4/17/2014</a:t>
             </a:fld>
             <a:endParaRPr lang="en-US"/>
           </a:p>
@@ -19880,7 +19880,7 @@
           <a:p>
             <a:fld id="{D686002E-580E-44D7-A942-32649A3AE9B3}" type="datetimeFigureOut">
               <a:rPr lang="en-US" smtClean="0"/>
-              <a:t>4/16/2014</a:t>
+              <a:t>4/17/2014</a:t>
             </a:fld>
             <a:endParaRPr lang="en-US"/>
           </a:p>
@@ -20130,7 +20130,7 @@
           <a:p>
             <a:fld id="{D686002E-580E-44D7-A942-32649A3AE9B3}" type="datetimeFigureOut">
               <a:rPr lang="en-US" smtClean="0"/>
-              <a:t>4/16/2014</a:t>
+              <a:t>4/17/2014</a:t>
             </a:fld>
             <a:endParaRPr lang="en-US"/>
           </a:p>
@@ -20837,8 +20837,8 @@
           </a:p>
         </p:txBody>
       </p:sp>
-      <mc:AlternateContent xmlns:mc="http://schemas.openxmlformats.org/markup-compatibility/2006">
-        <mc:Choice xmlns:a14="http://schemas.microsoft.com/office/drawing/2010/main" Requires="a14">
+      <mc:AlternateContent xmlns:mc="http://schemas.openxmlformats.org/markup-compatibility/2006" xmlns:a14="http://schemas.microsoft.com/office/drawing/2010/main">
+        <mc:Choice Requires="a14">
           <p:sp>
             <p:nvSpPr>
               <p:cNvPr id="3" name="Content Placeholder 2"/>
@@ -20869,31 +20869,45 @@
                     </m:oMathParaPr>
                     <m:oMath xmlns:m="http://schemas.openxmlformats.org/officeDocument/2006/math">
                       <m:r>
-                        <a:rPr lang="en-US" sz="2400" i="1"/>
+                        <a:rPr lang="en-US" sz="2400" i="1">
+                          <a:latin typeface="Cambria Math" panose="02040503050406030204" pitchFamily="18" charset="0"/>
+                        </a:rPr>
                         <m:t>𝑁</m:t>
                       </m:r>
                       <m:r>
-                        <a:rPr lang="en-US" sz="2400" i="1"/>
+                        <a:rPr lang="en-US" sz="2400" i="1">
+                          <a:latin typeface="Cambria Math" panose="02040503050406030204" pitchFamily="18" charset="0"/>
+                        </a:rPr>
                         <m:t>−</m:t>
                       </m:r>
                       <m:r>
-                        <a:rPr lang="en-US" sz="2400" i="1"/>
+                        <a:rPr lang="en-US" sz="2400" i="1">
+                          <a:latin typeface="Cambria Math" panose="02040503050406030204" pitchFamily="18" charset="0"/>
+                        </a:rPr>
                         <m:t>𝐼</m:t>
                       </m:r>
                       <m:r>
-                        <a:rPr lang="en-US" sz="2400"/>
+                        <a:rPr lang="en-US" sz="2400">
+                          <a:latin typeface="Cambria Math" panose="02040503050406030204" pitchFamily="18" charset="0"/>
+                        </a:rPr>
                         <m:t>=</m:t>
                       </m:r>
                       <m:r>
-                        <a:rPr lang="en-US" sz="2400" i="1"/>
+                        <a:rPr lang="en-US" sz="2400" i="1">
+                          <a:latin typeface="Cambria Math" panose="02040503050406030204" pitchFamily="18" charset="0"/>
+                        </a:rPr>
                         <m:t>𝑆</m:t>
                       </m:r>
                       <m:r>
-                        <a:rPr lang="en-US" sz="2400"/>
+                        <a:rPr lang="en-US" sz="2400">
+                          <a:latin typeface="Cambria Math" panose="02040503050406030204" pitchFamily="18" charset="0"/>
+                        </a:rPr>
                         <m:t>+</m:t>
                       </m:r>
                       <m:r>
-                        <a:rPr lang="en-US" sz="2400" i="1"/>
+                        <a:rPr lang="en-US" sz="2400" i="1">
+                          <a:latin typeface="Cambria Math" panose="02040503050406030204" pitchFamily="18" charset="0"/>
+                        </a:rPr>
                         <m:t>𝑅</m:t>
                       </m:r>
                     </m:oMath>
@@ -20917,36 +20931,50 @@
                       <m:f>
                         <m:fPr>
                           <m:ctrlPr>
-                            <a:rPr lang="en-US" sz="2400" i="1"/>
+                            <a:rPr lang="en-US" sz="2400" i="1">
+                              <a:latin typeface="Cambria Math" panose="02040503050406030204" pitchFamily="18" charset="0"/>
+                            </a:rPr>
                           </m:ctrlPr>
                         </m:fPr>
                         <m:num>
                           <m:r>
-                            <a:rPr lang="en-US" sz="2400" i="1"/>
+                            <a:rPr lang="en-US" sz="2400" i="1">
+                              <a:latin typeface="Cambria Math" panose="02040503050406030204" pitchFamily="18" charset="0"/>
+                            </a:rPr>
                             <m:t>𝑑𝐼</m:t>
                           </m:r>
                         </m:num>
                         <m:den>
                           <m:r>
-                            <a:rPr lang="en-US" sz="2400" i="1"/>
+                            <a:rPr lang="en-US" sz="2400" i="1">
+                              <a:latin typeface="Cambria Math" panose="02040503050406030204" pitchFamily="18" charset="0"/>
+                            </a:rPr>
                             <m:t>𝑑𝑡</m:t>
                           </m:r>
                         </m:den>
                       </m:f>
                       <m:r>
-                        <a:rPr lang="en-US" sz="2400"/>
+                        <a:rPr lang="en-US" sz="2400">
+                          <a:latin typeface="Cambria Math" panose="02040503050406030204" pitchFamily="18" charset="0"/>
+                        </a:rPr>
                         <m:t>=</m:t>
                       </m:r>
                       <m:r>
-                        <a:rPr lang="en-US" sz="2400" i="1"/>
+                        <a:rPr lang="en-US" sz="2400" i="1">
+                          <a:latin typeface="Cambria Math" panose="02040503050406030204" pitchFamily="18" charset="0"/>
+                        </a:rPr>
                         <m:t>−</m:t>
                       </m:r>
                       <m:r>
-                        <a:rPr lang="en-US" sz="2400" i="1"/>
+                        <a:rPr lang="en-US" sz="2400" i="1">
+                          <a:latin typeface="Cambria Math" panose="02040503050406030204" pitchFamily="18" charset="0"/>
+                        </a:rPr>
                         <m:t>𝜆</m:t>
                       </m:r>
                       <m:r>
-                        <a:rPr lang="en-US" sz="2400" i="1"/>
+                        <a:rPr lang="en-US" sz="2400" i="1">
+                          <a:latin typeface="Cambria Math" panose="02040503050406030204" pitchFamily="18" charset="0"/>
+                        </a:rPr>
                         <m:t>𝑘𝐼𝑆</m:t>
                       </m:r>
                     </m:oMath>
@@ -20970,77 +20998,109 @@
                       <m:f>
                         <m:fPr>
                           <m:ctrlPr>
-                            <a:rPr lang="en-US" sz="2400" i="1"/>
+                            <a:rPr lang="en-US" sz="2400" i="1">
+                              <a:latin typeface="Cambria Math" panose="02040503050406030204" pitchFamily="18" charset="0"/>
+                            </a:rPr>
                           </m:ctrlPr>
                         </m:fPr>
                         <m:num>
                           <m:r>
-                            <a:rPr lang="en-US" sz="2400" i="1"/>
+                            <a:rPr lang="en-US" sz="2400" i="1">
+                              <a:latin typeface="Cambria Math" panose="02040503050406030204" pitchFamily="18" charset="0"/>
+                            </a:rPr>
                             <m:t>𝑑𝑆</m:t>
                           </m:r>
                         </m:num>
                         <m:den>
                           <m:r>
-                            <a:rPr lang="en-US" sz="2400" i="1"/>
+                            <a:rPr lang="en-US" sz="2400" i="1">
+                              <a:latin typeface="Cambria Math" panose="02040503050406030204" pitchFamily="18" charset="0"/>
+                            </a:rPr>
                             <m:t>𝑑𝑡</m:t>
                           </m:r>
                         </m:den>
                       </m:f>
                       <m:r>
-                        <a:rPr lang="en-US" sz="2400"/>
+                        <a:rPr lang="en-US" sz="2400">
+                          <a:latin typeface="Cambria Math" panose="02040503050406030204" pitchFamily="18" charset="0"/>
+                        </a:rPr>
                         <m:t>=</m:t>
                       </m:r>
                       <m:r>
-                        <a:rPr lang="en-US" sz="2400" i="1"/>
+                        <a:rPr lang="en-US" sz="2400" i="1">
+                          <a:latin typeface="Cambria Math" panose="02040503050406030204" pitchFamily="18" charset="0"/>
+                        </a:rPr>
                         <m:t>𝜆</m:t>
                       </m:r>
                       <m:r>
-                        <a:rPr lang="en-US" sz="2400" i="1"/>
+                        <a:rPr lang="en-US" sz="2400" i="1">
+                          <a:latin typeface="Cambria Math" panose="02040503050406030204" pitchFamily="18" charset="0"/>
+                        </a:rPr>
                         <m:t>𝑘𝐼𝑆</m:t>
                       </m:r>
                       <m:r>
-                        <a:rPr lang="en-US" sz="2400" i="1"/>
+                        <a:rPr lang="en-US" sz="2400" i="1">
+                          <a:latin typeface="Cambria Math" panose="02040503050406030204" pitchFamily="18" charset="0"/>
+                        </a:rPr>
                         <m:t>−</m:t>
                       </m:r>
                       <m:r>
-                        <a:rPr lang="en-US" sz="2400" i="1"/>
+                        <a:rPr lang="en-US" sz="2400" i="1">
+                          <a:latin typeface="Cambria Math" panose="02040503050406030204" pitchFamily="18" charset="0"/>
+                        </a:rPr>
                         <m:t>𝛼</m:t>
                       </m:r>
                       <m:r>
-                        <a:rPr lang="en-US" sz="2400" i="1"/>
+                        <a:rPr lang="en-US" sz="2400" i="1">
+                          <a:latin typeface="Cambria Math" panose="02040503050406030204" pitchFamily="18" charset="0"/>
+                        </a:rPr>
                         <m:t>𝑘𝑆</m:t>
                       </m:r>
                       <m:d>
                         <m:dPr>
                           <m:ctrlPr>
-                            <a:rPr lang="en-US" sz="2400" i="1"/>
+                            <a:rPr lang="en-US" sz="2400" i="1">
+                              <a:latin typeface="Cambria Math" panose="02040503050406030204" pitchFamily="18" charset="0"/>
+                            </a:rPr>
                           </m:ctrlPr>
                         </m:dPr>
                         <m:e>
                           <m:r>
-                            <a:rPr lang="en-US" sz="2400" i="1"/>
+                            <a:rPr lang="en-US" sz="2400" i="1">
+                              <a:latin typeface="Cambria Math" panose="02040503050406030204" pitchFamily="18" charset="0"/>
+                            </a:rPr>
                             <m:t>𝑁</m:t>
                           </m:r>
                           <m:r>
-                            <a:rPr lang="en-US" sz="2400" i="1"/>
+                            <a:rPr lang="en-US" sz="2400" i="1">
+                              <a:latin typeface="Cambria Math" panose="02040503050406030204" pitchFamily="18" charset="0"/>
+                            </a:rPr>
                             <m:t>−</m:t>
                           </m:r>
                           <m:r>
-                            <a:rPr lang="en-US" sz="2400" i="1"/>
+                            <a:rPr lang="en-US" sz="2400" i="1">
+                              <a:latin typeface="Cambria Math" panose="02040503050406030204" pitchFamily="18" charset="0"/>
+                            </a:rPr>
                             <m:t>𝐼</m:t>
                           </m:r>
                         </m:e>
                       </m:d>
                       <m:r>
-                        <a:rPr lang="en-US" sz="2400" i="1"/>
+                        <a:rPr lang="en-US" sz="2400" i="1">
+                          <a:latin typeface="Cambria Math" panose="02040503050406030204" pitchFamily="18" charset="0"/>
+                        </a:rPr>
                         <m:t>−</m:t>
                       </m:r>
                       <m:r>
-                        <a:rPr lang="en-US" sz="2400" i="1"/>
+                        <a:rPr lang="en-US" sz="2400" i="1">
+                          <a:latin typeface="Cambria Math" panose="02040503050406030204" pitchFamily="18" charset="0"/>
+                        </a:rPr>
                         <m:t>𝛿</m:t>
                       </m:r>
                       <m:r>
-                        <a:rPr lang="en-US" sz="2400" i="1"/>
+                        <a:rPr lang="en-US" sz="2400" i="1">
+                          <a:latin typeface="Cambria Math" panose="02040503050406030204" pitchFamily="18" charset="0"/>
+                        </a:rPr>
                         <m:t>𝑆</m:t>
                       </m:r>
                     </m:oMath>
@@ -21051,7 +21111,7 @@
             </p:txBody>
           </p:sp>
         </mc:Choice>
-        <mc:Fallback>
+        <mc:Fallback xmlns="">
           <p:sp>
             <p:nvSpPr>
               <p:cNvPr id="3" name="Content Placeholder 2"/>
@@ -21458,7 +21518,7 @@
         </p:nvGraphicFramePr>
         <p:xfrm>
           <a:off x="4000658" y="2577303"/>
-          <a:ext cx="3766821" cy="3529394"/>
+          <a:ext cx="3766821" cy="3619505"/>
         </p:xfrm>
         <a:graphic>
           <a:graphicData uri="http://schemas.openxmlformats.org/drawingml/2006/table">
@@ -24105,6 +24165,22 @@
             </a:r>
             <a:endParaRPr lang="en-US" dirty="0"/>
           </a:p>
+          <a:p>
+            <a:pPr marL="0" indent="0">
+              <a:buNone/>
+            </a:pPr>
+            <a:r>
+              <a:rPr lang="en-US" dirty="0" smtClean="0"/>
+              <a:t>Repeat 10 times and average the results</a:t>
+            </a:r>
+            <a:endParaRPr lang="en-US" dirty="0"/>
+          </a:p>
+          <a:p>
+            <a:pPr marL="0" indent="0">
+              <a:buNone/>
+            </a:pPr>
+            <a:endParaRPr lang="en-US" dirty="0" smtClean="0"/>
+          </a:p>
         </p:txBody>
       </p:sp>
     </p:spTree>
@@ -24255,7 +24331,15 @@
             </a:r>
             <a:r>
               <a:rPr lang="en-US" dirty="0" smtClean="0"/>
-              <a:t>a node interacts with in an hour*</a:t>
+              <a:t>a node </a:t>
+            </a:r>
+            <a:r>
+              <a:rPr lang="en-US" smtClean="0"/>
+              <a:t>interacts within </a:t>
+            </a:r>
+            <a:r>
+              <a:rPr lang="en-US" dirty="0" smtClean="0"/>
+              <a:t>an hour*</a:t>
             </a:r>
             <a:endParaRPr lang="en-US" dirty="0"/>
           </a:p>
@@ -25032,7 +25116,19 @@
           <a:p>
             <a:r>
               <a:rPr lang="en-US" dirty="0" smtClean="0"/>
-              <a:t>2014: Wayne Wright’s alleged death</a:t>
+              <a:t>2014: Wayne </a:t>
+            </a:r>
+            <a:r>
+              <a:rPr lang="en-US" dirty="0" smtClean="0"/>
+              <a:t>Kn</a:t>
+            </a:r>
+            <a:r>
+              <a:rPr lang="en-US" dirty="0" smtClean="0"/>
+              <a:t>ight’s </a:t>
+            </a:r>
+            <a:r>
+              <a:rPr lang="en-US" dirty="0" smtClean="0"/>
+              <a:t>alleged death</a:t>
             </a:r>
             <a:endParaRPr lang="en-US" dirty="0"/>
           </a:p>
@@ -37105,14 +37201,14 @@
           <a:lstStyle/>
           <a:p>
             <a:r>
-              <a:rPr lang="en-US" dirty="0" smtClean="0"/>
-              <a:t>SIR model hybrid</a:t>
+              <a:rPr lang="en-US" dirty="0"/>
+              <a:t>Population size is constant</a:t>
             </a:r>
           </a:p>
           <a:p>
             <a:r>
               <a:rPr lang="en-US" dirty="0" smtClean="0"/>
-              <a:t>Population size is constant</a:t>
+              <a:t>SIR model hybrid</a:t>
             </a:r>
           </a:p>
           <a:p>
@@ -37356,8 +37452,8 @@
           </a:p>
         </p:txBody>
       </p:sp>
-      <mc:AlternateContent xmlns:mc="http://schemas.openxmlformats.org/markup-compatibility/2006">
-        <mc:Choice xmlns:a14="http://schemas.microsoft.com/office/drawing/2010/main" Requires="a14">
+      <mc:AlternateContent xmlns:mc="http://schemas.openxmlformats.org/markup-compatibility/2006" xmlns:a14="http://schemas.microsoft.com/office/drawing/2010/main">
+        <mc:Choice Requires="a14">
           <p:sp>
             <p:nvSpPr>
               <p:cNvPr id="3" name="Content Placeholder 2"/>
@@ -37425,7 +37521,9 @@
                 <a14:m>
                   <m:oMath xmlns:m="http://schemas.openxmlformats.org/officeDocument/2006/math">
                     <m:r>
-                      <a:rPr lang="en-US" i="1"/>
+                      <a:rPr lang="en-US" i="1">
+                        <a:latin typeface="Cambria Math" panose="02040503050406030204" pitchFamily="18" charset="0"/>
+                      </a:rPr>
                       <m:t>𝜆</m:t>
                     </m:r>
                   </m:oMath>
@@ -37452,7 +37550,9 @@
                 <a14:m>
                   <m:oMath xmlns:m="http://schemas.openxmlformats.org/officeDocument/2006/math">
                     <m:r>
-                      <a:rPr lang="en-US" i="1"/>
+                      <a:rPr lang="en-US" i="1">
+                        <a:latin typeface="Cambria Math" panose="02040503050406030204" pitchFamily="18" charset="0"/>
+                      </a:rPr>
                       <m:t>𝛼</m:t>
                     </m:r>
                   </m:oMath>
@@ -37462,7 +37562,7 @@
             </p:txBody>
           </p:sp>
         </mc:Choice>
-        <mc:Fallback>
+        <mc:Fallback xmlns="">
           <p:sp>
             <p:nvSpPr>
               <p:cNvPr id="3" name="Content Placeholder 2"/>
@@ -37556,8 +37656,8 @@
           </a:p>
         </p:txBody>
       </p:sp>
-      <mc:AlternateContent xmlns:mc="http://schemas.openxmlformats.org/markup-compatibility/2006">
-        <mc:Choice xmlns:a14="http://schemas.microsoft.com/office/drawing/2010/main" Requires="a14">
+      <mc:AlternateContent xmlns:mc="http://schemas.openxmlformats.org/markup-compatibility/2006" xmlns:a14="http://schemas.microsoft.com/office/drawing/2010/main">
+        <mc:Choice Requires="a14">
           <p:sp>
             <p:nvSpPr>
               <p:cNvPr id="3" name="Content Placeholder 2"/>
@@ -37591,31 +37691,45 @@
                     </m:oMathParaPr>
                     <m:oMath xmlns:m="http://schemas.openxmlformats.org/officeDocument/2006/math">
                       <m:r>
-                        <a:rPr lang="en-US" sz="2400" i="1"/>
+                        <a:rPr lang="en-US" sz="2400" i="1">
+                          <a:latin typeface="Cambria Math" panose="02040503050406030204" pitchFamily="18" charset="0"/>
+                        </a:rPr>
                         <m:t>𝑁</m:t>
                       </m:r>
                       <m:r>
-                        <a:rPr lang="en-US" sz="2400"/>
+                        <a:rPr lang="en-US" sz="2400">
+                          <a:latin typeface="Cambria Math" panose="02040503050406030204" pitchFamily="18" charset="0"/>
+                        </a:rPr>
                         <m:t>=</m:t>
                       </m:r>
                       <m:r>
-                        <a:rPr lang="en-US" sz="2400" i="1"/>
+                        <a:rPr lang="en-US" sz="2400" i="1">
+                          <a:latin typeface="Cambria Math" panose="02040503050406030204" pitchFamily="18" charset="0"/>
+                        </a:rPr>
                         <m:t>𝐼</m:t>
                       </m:r>
                       <m:r>
-                        <a:rPr lang="en-US" sz="2400"/>
+                        <a:rPr lang="en-US" sz="2400">
+                          <a:latin typeface="Cambria Math" panose="02040503050406030204" pitchFamily="18" charset="0"/>
+                        </a:rPr>
                         <m:t>+</m:t>
                       </m:r>
                       <m:r>
-                        <a:rPr lang="en-US" sz="2400" i="1"/>
+                        <a:rPr lang="en-US" sz="2400" i="1">
+                          <a:latin typeface="Cambria Math" panose="02040503050406030204" pitchFamily="18" charset="0"/>
+                        </a:rPr>
                         <m:t>𝑆</m:t>
                       </m:r>
                       <m:r>
-                        <a:rPr lang="en-US" sz="2400"/>
+                        <a:rPr lang="en-US" sz="2400">
+                          <a:latin typeface="Cambria Math" panose="02040503050406030204" pitchFamily="18" charset="0"/>
+                        </a:rPr>
                         <m:t>+</m:t>
                       </m:r>
                       <m:r>
-                        <a:rPr lang="en-US" sz="2400" i="1"/>
+                        <a:rPr lang="en-US" sz="2400" i="1">
+                          <a:latin typeface="Cambria Math" panose="02040503050406030204" pitchFamily="18" charset="0"/>
+                        </a:rPr>
                         <m:t>𝑅</m:t>
                       </m:r>
                     </m:oMath>
@@ -37642,36 +37756,50 @@
                       <m:f>
                         <m:fPr>
                           <m:ctrlPr>
-                            <a:rPr lang="en-US" sz="2400" i="1"/>
+                            <a:rPr lang="en-US" sz="2400" i="1">
+                              <a:latin typeface="Cambria Math" panose="02040503050406030204" pitchFamily="18" charset="0"/>
+                            </a:rPr>
                           </m:ctrlPr>
                         </m:fPr>
                         <m:num>
                           <m:r>
-                            <a:rPr lang="en-US" sz="2400" i="1"/>
+                            <a:rPr lang="en-US" sz="2400" i="1">
+                              <a:latin typeface="Cambria Math" panose="02040503050406030204" pitchFamily="18" charset="0"/>
+                            </a:rPr>
                             <m:t>𝑑𝐼</m:t>
                           </m:r>
                         </m:num>
                         <m:den>
                           <m:r>
-                            <a:rPr lang="en-US" sz="2400" i="1"/>
+                            <a:rPr lang="en-US" sz="2400" i="1">
+                              <a:latin typeface="Cambria Math" panose="02040503050406030204" pitchFamily="18" charset="0"/>
+                            </a:rPr>
                             <m:t>𝑑𝑡</m:t>
                           </m:r>
                         </m:den>
                       </m:f>
                       <m:r>
-                        <a:rPr lang="en-US" sz="2400"/>
+                        <a:rPr lang="en-US" sz="2400">
+                          <a:latin typeface="Cambria Math" panose="02040503050406030204" pitchFamily="18" charset="0"/>
+                        </a:rPr>
                         <m:t>=</m:t>
                       </m:r>
                       <m:r>
-                        <a:rPr lang="en-US" sz="2400" i="1"/>
+                        <a:rPr lang="en-US" sz="2400" i="1">
+                          <a:latin typeface="Cambria Math" panose="02040503050406030204" pitchFamily="18" charset="0"/>
+                        </a:rPr>
                         <m:t>−</m:t>
                       </m:r>
                       <m:r>
-                        <a:rPr lang="en-US" sz="2400" i="1"/>
+                        <a:rPr lang="en-US" sz="2400" i="1">
+                          <a:latin typeface="Cambria Math" panose="02040503050406030204" pitchFamily="18" charset="0"/>
+                        </a:rPr>
                         <m:t>𝜆</m:t>
                       </m:r>
                       <m:r>
-                        <a:rPr lang="en-US" sz="2400" i="1"/>
+                        <a:rPr lang="en-US" sz="2400" i="1">
+                          <a:latin typeface="Cambria Math" panose="02040503050406030204" pitchFamily="18" charset="0"/>
+                        </a:rPr>
                         <m:t>𝑘𝐼𝑆</m:t>
                       </m:r>
                     </m:oMath>
@@ -37698,64 +37826,92 @@
                       <m:f>
                         <m:fPr>
                           <m:ctrlPr>
-                            <a:rPr lang="en-US" sz="2400" i="1"/>
+                            <a:rPr lang="en-US" sz="2400" i="1">
+                              <a:latin typeface="Cambria Math" panose="02040503050406030204" pitchFamily="18" charset="0"/>
+                            </a:rPr>
                           </m:ctrlPr>
                         </m:fPr>
                         <m:num>
                           <m:r>
-                            <a:rPr lang="en-US" sz="2400" i="1"/>
+                            <a:rPr lang="en-US" sz="2400" i="1">
+                              <a:latin typeface="Cambria Math" panose="02040503050406030204" pitchFamily="18" charset="0"/>
+                            </a:rPr>
                             <m:t>𝑑𝑆</m:t>
                           </m:r>
                         </m:num>
                         <m:den>
                           <m:r>
-                            <a:rPr lang="en-US" sz="2400" i="1"/>
+                            <a:rPr lang="en-US" sz="2400" i="1">
+                              <a:latin typeface="Cambria Math" panose="02040503050406030204" pitchFamily="18" charset="0"/>
+                            </a:rPr>
                             <m:t>𝑑𝑡</m:t>
                           </m:r>
                         </m:den>
                       </m:f>
                       <m:r>
-                        <a:rPr lang="en-US" sz="2400"/>
+                        <a:rPr lang="en-US" sz="2400">
+                          <a:latin typeface="Cambria Math" panose="02040503050406030204" pitchFamily="18" charset="0"/>
+                        </a:rPr>
                         <m:t>=</m:t>
                       </m:r>
                       <m:r>
-                        <a:rPr lang="en-US" sz="2400" i="1"/>
+                        <a:rPr lang="en-US" sz="2400" i="1">
+                          <a:latin typeface="Cambria Math" panose="02040503050406030204" pitchFamily="18" charset="0"/>
+                        </a:rPr>
                         <m:t>𝜆</m:t>
                       </m:r>
                       <m:r>
-                        <a:rPr lang="en-US" sz="2400" i="1"/>
+                        <a:rPr lang="en-US" sz="2400" i="1">
+                          <a:latin typeface="Cambria Math" panose="02040503050406030204" pitchFamily="18" charset="0"/>
+                        </a:rPr>
                         <m:t>𝑘𝐼𝑆</m:t>
                       </m:r>
                       <m:r>
-                        <a:rPr lang="en-US" sz="2400" i="1"/>
+                        <a:rPr lang="en-US" sz="2400" i="1">
+                          <a:latin typeface="Cambria Math" panose="02040503050406030204" pitchFamily="18" charset="0"/>
+                        </a:rPr>
                         <m:t>−</m:t>
                       </m:r>
                       <m:r>
-                        <a:rPr lang="en-US" sz="2400" i="1"/>
+                        <a:rPr lang="en-US" sz="2400" i="1">
+                          <a:latin typeface="Cambria Math" panose="02040503050406030204" pitchFamily="18" charset="0"/>
+                        </a:rPr>
                         <m:t>𝛼</m:t>
                       </m:r>
                       <m:r>
-                        <a:rPr lang="en-US" sz="2400" i="1"/>
+                        <a:rPr lang="en-US" sz="2400" i="1">
+                          <a:latin typeface="Cambria Math" panose="02040503050406030204" pitchFamily="18" charset="0"/>
+                        </a:rPr>
                         <m:t>𝑘𝑆</m:t>
                       </m:r>
                       <m:r>
-                        <a:rPr lang="en-US" sz="2400"/>
+                        <a:rPr lang="en-US" sz="2400">
+                          <a:latin typeface="Cambria Math" panose="02040503050406030204" pitchFamily="18" charset="0"/>
+                        </a:rPr>
                         <m:t>(</m:t>
                       </m:r>
                       <m:r>
-                        <a:rPr lang="en-US" sz="2400" i="1"/>
+                        <a:rPr lang="en-US" sz="2400" i="1">
+                          <a:latin typeface="Cambria Math" panose="02040503050406030204" pitchFamily="18" charset="0"/>
+                        </a:rPr>
                         <m:t>𝑆</m:t>
                       </m:r>
                       <m:r>
-                        <a:rPr lang="en-US" sz="2400"/>
+                        <a:rPr lang="en-US" sz="2400">
+                          <a:latin typeface="Cambria Math" panose="02040503050406030204" pitchFamily="18" charset="0"/>
+                        </a:rPr>
                         <m:t>+</m:t>
                       </m:r>
                       <m:r>
-                        <a:rPr lang="en-US" sz="2400" i="1"/>
+                        <a:rPr lang="en-US" sz="2400" i="1">
+                          <a:latin typeface="Cambria Math" panose="02040503050406030204" pitchFamily="18" charset="0"/>
+                        </a:rPr>
                         <m:t>𝑅</m:t>
                       </m:r>
                       <m:r>
-                        <a:rPr lang="en-US" sz="2400"/>
+                        <a:rPr lang="en-US" sz="2400">
+                          <a:latin typeface="Cambria Math" panose="02040503050406030204" pitchFamily="18" charset="0"/>
+                        </a:rPr>
                         <m:t>)</m:t>
                       </m:r>
                     </m:oMath>
@@ -37782,52 +37938,74 @@
                       <m:f>
                         <m:fPr>
                           <m:ctrlPr>
-                            <a:rPr lang="en-US" sz="2400" i="1"/>
+                            <a:rPr lang="en-US" sz="2400" i="1">
+                              <a:latin typeface="Cambria Math" panose="02040503050406030204" pitchFamily="18" charset="0"/>
+                            </a:rPr>
                           </m:ctrlPr>
                         </m:fPr>
                         <m:num>
                           <m:r>
-                            <a:rPr lang="en-US" sz="2400" i="1"/>
+                            <a:rPr lang="en-US" sz="2400" i="1">
+                              <a:latin typeface="Cambria Math" panose="02040503050406030204" pitchFamily="18" charset="0"/>
+                            </a:rPr>
                             <m:t>𝑑𝑅</m:t>
                           </m:r>
                         </m:num>
                         <m:den>
                           <m:r>
-                            <a:rPr lang="en-US" sz="2400" i="1"/>
+                            <a:rPr lang="en-US" sz="2400" i="1">
+                              <a:latin typeface="Cambria Math" panose="02040503050406030204" pitchFamily="18" charset="0"/>
+                            </a:rPr>
                             <m:t>𝑑𝑡</m:t>
                           </m:r>
                         </m:den>
                       </m:f>
                       <m:r>
-                        <a:rPr lang="en-US" sz="2400"/>
+                        <a:rPr lang="en-US" sz="2400">
+                          <a:latin typeface="Cambria Math" panose="02040503050406030204" pitchFamily="18" charset="0"/>
+                        </a:rPr>
                         <m:t>=</m:t>
                       </m:r>
                       <m:r>
-                        <a:rPr lang="en-US" sz="2400" i="1"/>
+                        <a:rPr lang="en-US" sz="2400" i="1">
+                          <a:latin typeface="Cambria Math" panose="02040503050406030204" pitchFamily="18" charset="0"/>
+                        </a:rPr>
                         <m:t>𝛼</m:t>
                       </m:r>
                       <m:r>
-                        <a:rPr lang="en-US" sz="2400" i="1"/>
+                        <a:rPr lang="en-US" sz="2400" i="1">
+                          <a:latin typeface="Cambria Math" panose="02040503050406030204" pitchFamily="18" charset="0"/>
+                        </a:rPr>
                         <m:t>𝑘𝑆</m:t>
                       </m:r>
                       <m:r>
-                        <a:rPr lang="en-US" sz="2400"/>
+                        <a:rPr lang="en-US" sz="2400">
+                          <a:latin typeface="Cambria Math" panose="02040503050406030204" pitchFamily="18" charset="0"/>
+                        </a:rPr>
                         <m:t>(</m:t>
                       </m:r>
                       <m:r>
-                        <a:rPr lang="en-US" sz="2400" i="1"/>
+                        <a:rPr lang="en-US" sz="2400" i="1">
+                          <a:latin typeface="Cambria Math" panose="02040503050406030204" pitchFamily="18" charset="0"/>
+                        </a:rPr>
                         <m:t>𝑆</m:t>
                       </m:r>
                       <m:r>
-                        <a:rPr lang="en-US" sz="2400"/>
+                        <a:rPr lang="en-US" sz="2400">
+                          <a:latin typeface="Cambria Math" panose="02040503050406030204" pitchFamily="18" charset="0"/>
+                        </a:rPr>
                         <m:t>+</m:t>
                       </m:r>
                       <m:r>
-                        <a:rPr lang="en-US" sz="2400" i="1"/>
+                        <a:rPr lang="en-US" sz="2400" i="1">
+                          <a:latin typeface="Cambria Math" panose="02040503050406030204" pitchFamily="18" charset="0"/>
+                        </a:rPr>
                         <m:t>𝑅</m:t>
                       </m:r>
                       <m:r>
-                        <a:rPr lang="en-US" sz="2400"/>
+                        <a:rPr lang="en-US" sz="2400">
+                          <a:latin typeface="Cambria Math" panose="02040503050406030204" pitchFamily="18" charset="0"/>
+                        </a:rPr>
                         <m:t>)</m:t>
                       </m:r>
                     </m:oMath>
@@ -37838,7 +38016,7 @@
             </p:txBody>
           </p:sp>
         </mc:Choice>
-        <mc:Fallback>
+        <mc:Fallback xmlns="">
           <p:sp>
             <p:nvSpPr>
               <p:cNvPr id="3" name="Content Placeholder 2"/>
@@ -37932,8 +38110,8 @@
           </a:p>
         </p:txBody>
       </p:sp>
-      <mc:AlternateContent xmlns:mc="http://schemas.openxmlformats.org/markup-compatibility/2006">
-        <mc:Choice xmlns:a14="http://schemas.microsoft.com/office/drawing/2010/main" Requires="a14">
+      <mc:AlternateContent xmlns:mc="http://schemas.openxmlformats.org/markup-compatibility/2006" xmlns:a14="http://schemas.microsoft.com/office/drawing/2010/main">
+        <mc:Choice Requires="a14">
           <p:sp>
             <p:nvSpPr>
               <p:cNvPr id="3" name="Content Placeholder 2"/>
@@ -37964,31 +38142,45 @@
                     </m:oMathParaPr>
                     <m:oMath xmlns:m="http://schemas.openxmlformats.org/officeDocument/2006/math">
                       <m:r>
-                        <a:rPr lang="en-US" sz="2400" i="1"/>
+                        <a:rPr lang="en-US" sz="2400" i="1">
+                          <a:latin typeface="Cambria Math" panose="02040503050406030204" pitchFamily="18" charset="0"/>
+                        </a:rPr>
                         <m:t>𝑁</m:t>
                       </m:r>
                       <m:r>
-                        <a:rPr lang="en-US" sz="2400" i="1"/>
+                        <a:rPr lang="en-US" sz="2400" i="1">
+                          <a:latin typeface="Cambria Math" panose="02040503050406030204" pitchFamily="18" charset="0"/>
+                        </a:rPr>
                         <m:t>−</m:t>
                       </m:r>
                       <m:r>
-                        <a:rPr lang="en-US" sz="2400" i="1"/>
+                        <a:rPr lang="en-US" sz="2400" i="1">
+                          <a:latin typeface="Cambria Math" panose="02040503050406030204" pitchFamily="18" charset="0"/>
+                        </a:rPr>
                         <m:t>𝐼</m:t>
                       </m:r>
                       <m:r>
-                        <a:rPr lang="en-US" sz="2400"/>
+                        <a:rPr lang="en-US" sz="2400">
+                          <a:latin typeface="Cambria Math" panose="02040503050406030204" pitchFamily="18" charset="0"/>
+                        </a:rPr>
                         <m:t>=</m:t>
                       </m:r>
                       <m:r>
-                        <a:rPr lang="en-US" sz="2400" i="1"/>
+                        <a:rPr lang="en-US" sz="2400" i="1">
+                          <a:latin typeface="Cambria Math" panose="02040503050406030204" pitchFamily="18" charset="0"/>
+                        </a:rPr>
                         <m:t>𝑆</m:t>
                       </m:r>
                       <m:r>
-                        <a:rPr lang="en-US" sz="2400"/>
+                        <a:rPr lang="en-US" sz="2400">
+                          <a:latin typeface="Cambria Math" panose="02040503050406030204" pitchFamily="18" charset="0"/>
+                        </a:rPr>
                         <m:t>+</m:t>
                       </m:r>
                       <m:r>
-                        <a:rPr lang="en-US" sz="2400" i="1"/>
+                        <a:rPr lang="en-US" sz="2400" i="1">
+                          <a:latin typeface="Cambria Math" panose="02040503050406030204" pitchFamily="18" charset="0"/>
+                        </a:rPr>
                         <m:t>𝑅</m:t>
                       </m:r>
                     </m:oMath>
@@ -38012,36 +38204,50 @@
                       <m:f>
                         <m:fPr>
                           <m:ctrlPr>
-                            <a:rPr lang="en-US" sz="2400" i="1"/>
+                            <a:rPr lang="en-US" sz="2400" i="1">
+                              <a:latin typeface="Cambria Math" panose="02040503050406030204" pitchFamily="18" charset="0"/>
+                            </a:rPr>
                           </m:ctrlPr>
                         </m:fPr>
                         <m:num>
                           <m:r>
-                            <a:rPr lang="en-US" sz="2400" i="1"/>
+                            <a:rPr lang="en-US" sz="2400" i="1">
+                              <a:latin typeface="Cambria Math" panose="02040503050406030204" pitchFamily="18" charset="0"/>
+                            </a:rPr>
                             <m:t>𝑑𝐼</m:t>
                           </m:r>
                         </m:num>
                         <m:den>
                           <m:r>
-                            <a:rPr lang="en-US" sz="2400" i="1"/>
+                            <a:rPr lang="en-US" sz="2400" i="1">
+                              <a:latin typeface="Cambria Math" panose="02040503050406030204" pitchFamily="18" charset="0"/>
+                            </a:rPr>
                             <m:t>𝑑𝑡</m:t>
                           </m:r>
                         </m:den>
                       </m:f>
                       <m:r>
-                        <a:rPr lang="en-US" sz="2400"/>
+                        <a:rPr lang="en-US" sz="2400">
+                          <a:latin typeface="Cambria Math" panose="02040503050406030204" pitchFamily="18" charset="0"/>
+                        </a:rPr>
                         <m:t>=</m:t>
                       </m:r>
                       <m:r>
-                        <a:rPr lang="en-US" sz="2400" i="1"/>
+                        <a:rPr lang="en-US" sz="2400" i="1">
+                          <a:latin typeface="Cambria Math" panose="02040503050406030204" pitchFamily="18" charset="0"/>
+                        </a:rPr>
                         <m:t>−</m:t>
                       </m:r>
                       <m:r>
-                        <a:rPr lang="en-US" sz="2400" i="1"/>
+                        <a:rPr lang="en-US" sz="2400" i="1">
+                          <a:latin typeface="Cambria Math" panose="02040503050406030204" pitchFamily="18" charset="0"/>
+                        </a:rPr>
                         <m:t>𝜆</m:t>
                       </m:r>
                       <m:r>
-                        <a:rPr lang="en-US" sz="2400" i="1"/>
+                        <a:rPr lang="en-US" sz="2400" i="1">
+                          <a:latin typeface="Cambria Math" panose="02040503050406030204" pitchFamily="18" charset="0"/>
+                        </a:rPr>
                         <m:t>𝑘𝐼𝑆</m:t>
                       </m:r>
                     </m:oMath>
@@ -38065,64 +38271,92 @@
                       <m:f>
                         <m:fPr>
                           <m:ctrlPr>
-                            <a:rPr lang="en-US" sz="2400" i="1"/>
+                            <a:rPr lang="en-US" sz="2400" i="1">
+                              <a:latin typeface="Cambria Math" panose="02040503050406030204" pitchFamily="18" charset="0"/>
+                            </a:rPr>
                           </m:ctrlPr>
                         </m:fPr>
                         <m:num>
                           <m:r>
-                            <a:rPr lang="en-US" sz="2400" i="1"/>
+                            <a:rPr lang="en-US" sz="2400" i="1">
+                              <a:latin typeface="Cambria Math" panose="02040503050406030204" pitchFamily="18" charset="0"/>
+                            </a:rPr>
                             <m:t>𝑑𝑆</m:t>
                           </m:r>
                         </m:num>
                         <m:den>
                           <m:r>
-                            <a:rPr lang="en-US" sz="2400" i="1"/>
+                            <a:rPr lang="en-US" sz="2400" i="1">
+                              <a:latin typeface="Cambria Math" panose="02040503050406030204" pitchFamily="18" charset="0"/>
+                            </a:rPr>
                             <m:t>𝑑𝑡</m:t>
                           </m:r>
                         </m:den>
                       </m:f>
                       <m:r>
-                        <a:rPr lang="en-US" sz="2400"/>
+                        <a:rPr lang="en-US" sz="2400">
+                          <a:latin typeface="Cambria Math" panose="02040503050406030204" pitchFamily="18" charset="0"/>
+                        </a:rPr>
                         <m:t>=</m:t>
                       </m:r>
                       <m:r>
-                        <a:rPr lang="en-US" sz="2400" i="1"/>
+                        <a:rPr lang="en-US" sz="2400" i="1">
+                          <a:latin typeface="Cambria Math" panose="02040503050406030204" pitchFamily="18" charset="0"/>
+                        </a:rPr>
                         <m:t>𝜆</m:t>
                       </m:r>
                       <m:r>
-                        <a:rPr lang="en-US" sz="2400" i="1"/>
+                        <a:rPr lang="en-US" sz="2400" i="1">
+                          <a:latin typeface="Cambria Math" panose="02040503050406030204" pitchFamily="18" charset="0"/>
+                        </a:rPr>
                         <m:t>𝑘𝐼𝑆</m:t>
                       </m:r>
                       <m:r>
-                        <a:rPr lang="en-US" sz="2400" i="1"/>
+                        <a:rPr lang="en-US" sz="2400" i="1">
+                          <a:latin typeface="Cambria Math" panose="02040503050406030204" pitchFamily="18" charset="0"/>
+                        </a:rPr>
                         <m:t>−</m:t>
                       </m:r>
                       <m:r>
-                        <a:rPr lang="en-US" sz="2400" i="1"/>
+                        <a:rPr lang="en-US" sz="2400" i="1">
+                          <a:latin typeface="Cambria Math" panose="02040503050406030204" pitchFamily="18" charset="0"/>
+                        </a:rPr>
                         <m:t>𝛼</m:t>
                       </m:r>
                       <m:r>
-                        <a:rPr lang="en-US" sz="2400" i="1"/>
+                        <a:rPr lang="en-US" sz="2400" i="1">
+                          <a:latin typeface="Cambria Math" panose="02040503050406030204" pitchFamily="18" charset="0"/>
+                        </a:rPr>
                         <m:t>𝑘𝑆</m:t>
                       </m:r>
                       <m:r>
-                        <a:rPr lang="en-US" sz="2400"/>
+                        <a:rPr lang="en-US" sz="2400">
+                          <a:latin typeface="Cambria Math" panose="02040503050406030204" pitchFamily="18" charset="0"/>
+                        </a:rPr>
                         <m:t>(</m:t>
                       </m:r>
                       <m:r>
-                        <a:rPr lang="en-US" sz="2400" i="1"/>
+                        <a:rPr lang="en-US" sz="2400" i="1">
+                          <a:latin typeface="Cambria Math" panose="02040503050406030204" pitchFamily="18" charset="0"/>
+                        </a:rPr>
                         <m:t>𝑁</m:t>
                       </m:r>
                       <m:r>
-                        <a:rPr lang="en-US" sz="2400" i="1"/>
+                        <a:rPr lang="en-US" sz="2400" i="1">
+                          <a:latin typeface="Cambria Math" panose="02040503050406030204" pitchFamily="18" charset="0"/>
+                        </a:rPr>
                         <m:t>−</m:t>
                       </m:r>
                       <m:r>
-                        <a:rPr lang="en-US" sz="2400" i="1"/>
+                        <a:rPr lang="en-US" sz="2400" i="1">
+                          <a:latin typeface="Cambria Math" panose="02040503050406030204" pitchFamily="18" charset="0"/>
+                        </a:rPr>
                         <m:t>𝐼</m:t>
                       </m:r>
                       <m:r>
-                        <a:rPr lang="en-US" sz="2400"/>
+                        <a:rPr lang="en-US" sz="2400">
+                          <a:latin typeface="Cambria Math" panose="02040503050406030204" pitchFamily="18" charset="0"/>
+                        </a:rPr>
                         <m:t>)</m:t>
                       </m:r>
                     </m:oMath>
@@ -38133,7 +38367,7 @@
             </p:txBody>
           </p:sp>
         </mc:Choice>
-        <mc:Fallback>
+        <mc:Fallback xmlns="">
           <p:sp>
             <p:nvSpPr>
               <p:cNvPr id="3" name="Content Placeholder 2"/>
@@ -38320,8 +38554,8 @@
           </a:p>
         </p:txBody>
       </p:sp>
-      <mc:AlternateContent xmlns:mc="http://schemas.openxmlformats.org/markup-compatibility/2006">
-        <mc:Choice xmlns:a14="http://schemas.microsoft.com/office/drawing/2010/main" Requires="a14">
+      <mc:AlternateContent xmlns:mc="http://schemas.openxmlformats.org/markup-compatibility/2006" xmlns:a14="http://schemas.microsoft.com/office/drawing/2010/main">
+        <mc:Choice Requires="a14">
           <p:sp>
             <p:nvSpPr>
               <p:cNvPr id="3" name="Content Placeholder 2"/>
@@ -38358,7 +38592,9 @@
                 <a14:m>
                   <m:oMath xmlns:m="http://schemas.openxmlformats.org/officeDocument/2006/math">
                     <m:r>
-                      <a:rPr lang="en-US" i="1"/>
+                      <a:rPr lang="en-US" i="1">
+                        <a:latin typeface="Cambria Math" panose="02040503050406030204" pitchFamily="18" charset="0"/>
+                      </a:rPr>
                       <m:t>𝛿</m:t>
                     </m:r>
                   </m:oMath>
@@ -38382,7 +38618,7 @@
             </p:txBody>
           </p:sp>
         </mc:Choice>
-        <mc:Fallback>
+        <mc:Fallback xmlns="">
           <p:sp>
             <p:nvSpPr>
               <p:cNvPr id="3" name="Content Placeholder 2"/>
@@ -38476,8 +38712,8 @@
           </a:p>
         </p:txBody>
       </p:sp>
-      <mc:AlternateContent xmlns:mc="http://schemas.openxmlformats.org/markup-compatibility/2006">
-        <mc:Choice xmlns:a14="http://schemas.microsoft.com/office/drawing/2010/main" Requires="a14">
+      <mc:AlternateContent xmlns:mc="http://schemas.openxmlformats.org/markup-compatibility/2006" xmlns:a14="http://schemas.microsoft.com/office/drawing/2010/main">
+        <mc:Choice Requires="a14">
           <p:sp>
             <p:nvSpPr>
               <p:cNvPr id="3" name="Content Placeholder 2"/>
@@ -38508,31 +38744,45 @@
                     </m:oMathParaPr>
                     <m:oMath xmlns:m="http://schemas.openxmlformats.org/officeDocument/2006/math">
                       <m:r>
-                        <a:rPr lang="en-US" sz="2400" i="1"/>
+                        <a:rPr lang="en-US" sz="2400" i="1">
+                          <a:latin typeface="Cambria Math" panose="02040503050406030204" pitchFamily="18" charset="0"/>
+                        </a:rPr>
                         <m:t>𝑁</m:t>
                       </m:r>
                       <m:r>
-                        <a:rPr lang="en-US" sz="2400"/>
+                        <a:rPr lang="en-US" sz="2400">
+                          <a:latin typeface="Cambria Math" panose="02040503050406030204" pitchFamily="18" charset="0"/>
+                        </a:rPr>
                         <m:t>=</m:t>
                       </m:r>
                       <m:r>
-                        <a:rPr lang="en-US" sz="2400" i="1"/>
+                        <a:rPr lang="en-US" sz="2400" i="1">
+                          <a:latin typeface="Cambria Math" panose="02040503050406030204" pitchFamily="18" charset="0"/>
+                        </a:rPr>
                         <m:t>𝐼</m:t>
                       </m:r>
                       <m:r>
-                        <a:rPr lang="en-US" sz="2400"/>
+                        <a:rPr lang="en-US" sz="2400">
+                          <a:latin typeface="Cambria Math" panose="02040503050406030204" pitchFamily="18" charset="0"/>
+                        </a:rPr>
                         <m:t>+</m:t>
                       </m:r>
                       <m:r>
-                        <a:rPr lang="en-US" sz="2400" i="1"/>
+                        <a:rPr lang="en-US" sz="2400" i="1">
+                          <a:latin typeface="Cambria Math" panose="02040503050406030204" pitchFamily="18" charset="0"/>
+                        </a:rPr>
                         <m:t>𝑆</m:t>
                       </m:r>
                       <m:r>
-                        <a:rPr lang="en-US" sz="2400"/>
+                        <a:rPr lang="en-US" sz="2400">
+                          <a:latin typeface="Cambria Math" panose="02040503050406030204" pitchFamily="18" charset="0"/>
+                        </a:rPr>
                         <m:t>+</m:t>
                       </m:r>
                       <m:r>
-                        <a:rPr lang="en-US" sz="2400" i="1"/>
+                        <a:rPr lang="en-US" sz="2400" i="1">
+                          <a:latin typeface="Cambria Math" panose="02040503050406030204" pitchFamily="18" charset="0"/>
+                        </a:rPr>
                         <m:t>𝑅</m:t>
                       </m:r>
                     </m:oMath>
@@ -38556,36 +38806,50 @@
                       <m:f>
                         <m:fPr>
                           <m:ctrlPr>
-                            <a:rPr lang="en-US" sz="2400" i="1"/>
+                            <a:rPr lang="en-US" sz="2400" i="1">
+                              <a:latin typeface="Cambria Math" panose="02040503050406030204" pitchFamily="18" charset="0"/>
+                            </a:rPr>
                           </m:ctrlPr>
                         </m:fPr>
                         <m:num>
                           <m:r>
-                            <a:rPr lang="en-US" sz="2400" i="1"/>
+                            <a:rPr lang="en-US" sz="2400" i="1">
+                              <a:latin typeface="Cambria Math" panose="02040503050406030204" pitchFamily="18" charset="0"/>
+                            </a:rPr>
                             <m:t>𝑑𝐼</m:t>
                           </m:r>
                         </m:num>
                         <m:den>
                           <m:r>
-                            <a:rPr lang="en-US" sz="2400" i="1"/>
+                            <a:rPr lang="en-US" sz="2400" i="1">
+                              <a:latin typeface="Cambria Math" panose="02040503050406030204" pitchFamily="18" charset="0"/>
+                            </a:rPr>
                             <m:t>𝑑𝑡</m:t>
                           </m:r>
                         </m:den>
                       </m:f>
                       <m:r>
-                        <a:rPr lang="en-US" sz="2400"/>
+                        <a:rPr lang="en-US" sz="2400">
+                          <a:latin typeface="Cambria Math" panose="02040503050406030204" pitchFamily="18" charset="0"/>
+                        </a:rPr>
                         <m:t>=</m:t>
                       </m:r>
                       <m:r>
-                        <a:rPr lang="en-US" sz="2400" i="1"/>
+                        <a:rPr lang="en-US" sz="2400" i="1">
+                          <a:latin typeface="Cambria Math" panose="02040503050406030204" pitchFamily="18" charset="0"/>
+                        </a:rPr>
                         <m:t>−</m:t>
                       </m:r>
                       <m:r>
-                        <a:rPr lang="en-US" sz="2400" i="1"/>
+                        <a:rPr lang="en-US" sz="2400" i="1">
+                          <a:latin typeface="Cambria Math" panose="02040503050406030204" pitchFamily="18" charset="0"/>
+                        </a:rPr>
                         <m:t>𝜆</m:t>
                       </m:r>
                       <m:r>
-                        <a:rPr lang="en-US" sz="2400" i="1"/>
+                        <a:rPr lang="en-US" sz="2400" i="1">
+                          <a:latin typeface="Cambria Math" panose="02040503050406030204" pitchFamily="18" charset="0"/>
+                        </a:rPr>
                         <m:t>𝑘𝐼𝑆</m:t>
                       </m:r>
                     </m:oMath>
@@ -38609,77 +38873,109 @@
                       <m:f>
                         <m:fPr>
                           <m:ctrlPr>
-                            <a:rPr lang="en-US" sz="2400" i="1"/>
+                            <a:rPr lang="en-US" sz="2400" i="1">
+                              <a:latin typeface="Cambria Math" panose="02040503050406030204" pitchFamily="18" charset="0"/>
+                            </a:rPr>
                           </m:ctrlPr>
                         </m:fPr>
                         <m:num>
                           <m:r>
-                            <a:rPr lang="en-US" sz="2400" i="1"/>
+                            <a:rPr lang="en-US" sz="2400" i="1">
+                              <a:latin typeface="Cambria Math" panose="02040503050406030204" pitchFamily="18" charset="0"/>
+                            </a:rPr>
                             <m:t>𝑑𝑆</m:t>
                           </m:r>
                         </m:num>
                         <m:den>
                           <m:r>
-                            <a:rPr lang="en-US" sz="2400" i="1"/>
+                            <a:rPr lang="en-US" sz="2400" i="1">
+                              <a:latin typeface="Cambria Math" panose="02040503050406030204" pitchFamily="18" charset="0"/>
+                            </a:rPr>
                             <m:t>𝑑𝑡</m:t>
                           </m:r>
                         </m:den>
                       </m:f>
                       <m:r>
-                        <a:rPr lang="en-US" sz="2400"/>
+                        <a:rPr lang="en-US" sz="2400">
+                          <a:latin typeface="Cambria Math" panose="02040503050406030204" pitchFamily="18" charset="0"/>
+                        </a:rPr>
                         <m:t>=</m:t>
                       </m:r>
                       <m:r>
-                        <a:rPr lang="en-US" sz="2400" i="1"/>
+                        <a:rPr lang="en-US" sz="2400" i="1">
+                          <a:latin typeface="Cambria Math" panose="02040503050406030204" pitchFamily="18" charset="0"/>
+                        </a:rPr>
                         <m:t>𝜆</m:t>
                       </m:r>
                       <m:r>
-                        <a:rPr lang="en-US" sz="2400" i="1"/>
+                        <a:rPr lang="en-US" sz="2400" i="1">
+                          <a:latin typeface="Cambria Math" panose="02040503050406030204" pitchFamily="18" charset="0"/>
+                        </a:rPr>
                         <m:t>𝑘𝐼𝑆</m:t>
                       </m:r>
                       <m:r>
-                        <a:rPr lang="en-US" sz="2400" i="1"/>
+                        <a:rPr lang="en-US" sz="2400" i="1">
+                          <a:latin typeface="Cambria Math" panose="02040503050406030204" pitchFamily="18" charset="0"/>
+                        </a:rPr>
                         <m:t>−</m:t>
                       </m:r>
                       <m:r>
-                        <a:rPr lang="en-US" sz="2400" i="1"/>
+                        <a:rPr lang="en-US" sz="2400" i="1">
+                          <a:latin typeface="Cambria Math" panose="02040503050406030204" pitchFamily="18" charset="0"/>
+                        </a:rPr>
                         <m:t>𝛼</m:t>
                       </m:r>
                       <m:r>
-                        <a:rPr lang="en-US" sz="2400" i="1"/>
+                        <a:rPr lang="en-US" sz="2400" i="1">
+                          <a:latin typeface="Cambria Math" panose="02040503050406030204" pitchFamily="18" charset="0"/>
+                        </a:rPr>
                         <m:t>𝑘𝑆</m:t>
                       </m:r>
                       <m:d>
                         <m:dPr>
                           <m:ctrlPr>
-                            <a:rPr lang="en-US" sz="2400" i="1"/>
+                            <a:rPr lang="en-US" sz="2400" i="1">
+                              <a:latin typeface="Cambria Math" panose="02040503050406030204" pitchFamily="18" charset="0"/>
+                            </a:rPr>
                           </m:ctrlPr>
                         </m:dPr>
                         <m:e>
                           <m:r>
-                            <a:rPr lang="en-US" sz="2400" i="1"/>
+                            <a:rPr lang="en-US" sz="2400" i="1">
+                              <a:latin typeface="Cambria Math" panose="02040503050406030204" pitchFamily="18" charset="0"/>
+                            </a:rPr>
                             <m:t>𝑆</m:t>
                           </m:r>
                           <m:r>
-                            <a:rPr lang="en-US" sz="2400"/>
+                            <a:rPr lang="en-US" sz="2400">
+                              <a:latin typeface="Cambria Math" panose="02040503050406030204" pitchFamily="18" charset="0"/>
+                            </a:rPr>
                             <m:t>+</m:t>
                           </m:r>
                           <m:r>
-                            <a:rPr lang="en-US" sz="2400" i="1"/>
+                            <a:rPr lang="en-US" sz="2400" i="1">
+                              <a:latin typeface="Cambria Math" panose="02040503050406030204" pitchFamily="18" charset="0"/>
+                            </a:rPr>
                             <m:t>𝑅</m:t>
                           </m:r>
                         </m:e>
                       </m:d>
                       <m:r>
-                        <a:rPr lang="en-US" sz="2400" i="1"/>
+                        <a:rPr lang="en-US" sz="2400" i="1">
+                          <a:latin typeface="Cambria Math" panose="02040503050406030204" pitchFamily="18" charset="0"/>
+                        </a:rPr>
                         <m:t>−</m:t>
                       </m:r>
                       <m:r>
-                        <a:rPr lang="en-US" sz="2400" i="1"/>
+                        <a:rPr lang="en-US" sz="2400" i="1">
+                          <a:latin typeface="Cambria Math" panose="02040503050406030204" pitchFamily="18" charset="0"/>
+                        </a:rPr>
                         <m:t>𝛿</m:t>
                       </m:r>
                       <m:r>
-                        <a:rPr lang="en-US" sz="2400" i="1"/>
+                        <a:rPr lang="en-US" sz="2400" i="1">
+                          <a:latin typeface="Cambria Math" panose="02040503050406030204" pitchFamily="18" charset="0"/>
+                        </a:rPr>
                         <m:t>𝑆</m:t>
                       </m:r>
                     </m:oMath>
@@ -38703,65 +38999,91 @@
                       <m:f>
                         <m:fPr>
                           <m:ctrlPr>
-                            <a:rPr lang="en-US" sz="2400" i="1"/>
+                            <a:rPr lang="en-US" sz="2400" i="1">
+                              <a:latin typeface="Cambria Math" panose="02040503050406030204" pitchFamily="18" charset="0"/>
+                            </a:rPr>
                           </m:ctrlPr>
                         </m:fPr>
                         <m:num>
                           <m:r>
-                            <a:rPr lang="en-US" sz="2400" i="1"/>
+                            <a:rPr lang="en-US" sz="2400" i="1">
+                              <a:latin typeface="Cambria Math" panose="02040503050406030204" pitchFamily="18" charset="0"/>
+                            </a:rPr>
                             <m:t>𝑑𝑅</m:t>
                           </m:r>
                         </m:num>
                         <m:den>
                           <m:r>
-                            <a:rPr lang="en-US" sz="2400" i="1"/>
+                            <a:rPr lang="en-US" sz="2400" i="1">
+                              <a:latin typeface="Cambria Math" panose="02040503050406030204" pitchFamily="18" charset="0"/>
+                            </a:rPr>
                             <m:t>𝑑𝑡</m:t>
                           </m:r>
                         </m:den>
                       </m:f>
                       <m:r>
-                        <a:rPr lang="en-US" sz="2400"/>
+                        <a:rPr lang="en-US" sz="2400">
+                          <a:latin typeface="Cambria Math" panose="02040503050406030204" pitchFamily="18" charset="0"/>
+                        </a:rPr>
                         <m:t>=</m:t>
                       </m:r>
                       <m:r>
-                        <a:rPr lang="en-US" sz="2400" i="1"/>
+                        <a:rPr lang="en-US" sz="2400" i="1">
+                          <a:latin typeface="Cambria Math" panose="02040503050406030204" pitchFamily="18" charset="0"/>
+                        </a:rPr>
                         <m:t>𝛼</m:t>
                       </m:r>
                       <m:r>
-                        <a:rPr lang="en-US" sz="2400" i="1"/>
+                        <a:rPr lang="en-US" sz="2400" i="1">
+                          <a:latin typeface="Cambria Math" panose="02040503050406030204" pitchFamily="18" charset="0"/>
+                        </a:rPr>
                         <m:t>𝑘𝑆</m:t>
                       </m:r>
                       <m:d>
                         <m:dPr>
                           <m:ctrlPr>
-                            <a:rPr lang="en-US" sz="2400" i="1"/>
+                            <a:rPr lang="en-US" sz="2400" i="1">
+                              <a:latin typeface="Cambria Math" panose="02040503050406030204" pitchFamily="18" charset="0"/>
+                            </a:rPr>
                           </m:ctrlPr>
                         </m:dPr>
                         <m:e>
                           <m:r>
-                            <a:rPr lang="en-US" sz="2400" i="1"/>
+                            <a:rPr lang="en-US" sz="2400" i="1">
+                              <a:latin typeface="Cambria Math" panose="02040503050406030204" pitchFamily="18" charset="0"/>
+                            </a:rPr>
                             <m:t>𝑆</m:t>
                           </m:r>
                           <m:r>
-                            <a:rPr lang="en-US" sz="2400"/>
+                            <a:rPr lang="en-US" sz="2400">
+                              <a:latin typeface="Cambria Math" panose="02040503050406030204" pitchFamily="18" charset="0"/>
+                            </a:rPr>
                             <m:t>+</m:t>
                           </m:r>
                           <m:r>
-                            <a:rPr lang="en-US" sz="2400" i="1"/>
+                            <a:rPr lang="en-US" sz="2400" i="1">
+                              <a:latin typeface="Cambria Math" panose="02040503050406030204" pitchFamily="18" charset="0"/>
+                            </a:rPr>
                             <m:t>𝑅</m:t>
                           </m:r>
                         </m:e>
                       </m:d>
                       <m:r>
-                        <a:rPr lang="en-US" sz="2400"/>
+                        <a:rPr lang="en-US" sz="2400">
+                          <a:latin typeface="Cambria Math" panose="02040503050406030204" pitchFamily="18" charset="0"/>
+                        </a:rPr>
                         <m:t>+</m:t>
                       </m:r>
                       <m:r>
-                        <a:rPr lang="en-US" sz="2400" i="1"/>
+                        <a:rPr lang="en-US" sz="2400" i="1">
+                          <a:latin typeface="Cambria Math" panose="02040503050406030204" pitchFamily="18" charset="0"/>
+                        </a:rPr>
                         <m:t>𝛿</m:t>
                       </m:r>
                       <m:r>
-                        <a:rPr lang="en-US" sz="2400" i="1"/>
+                        <a:rPr lang="en-US" sz="2400" i="1">
+                          <a:latin typeface="Cambria Math" panose="02040503050406030204" pitchFamily="18" charset="0"/>
+                        </a:rPr>
                         <m:t>𝑆</m:t>
                       </m:r>
                     </m:oMath>
@@ -38772,7 +39094,7 @@
             </p:txBody>
           </p:sp>
         </mc:Choice>
-        <mc:Fallback>
+        <mc:Fallback xmlns="">
           <p:sp>
             <p:nvSpPr>
               <p:cNvPr id="3" name="Content Placeholder 2"/>

</xml_diff>